<commit_message>
Updated a lot of the plotting code, the basic test that is provided does not show any data at the moment but it does show the chart starting to come togather.
Started writing a paper report/summary of the conclusions. Slides added to a little bit as well.
</commit_message>
<xml_diff>
--- a/doc/DDSimulation_Graphical.pptx
+++ b/doc/DDSimulation_Graphical.pptx
@@ -18,7 +18,10 @@
     <p:sldId id="262" r:id="rId12"/>
     <p:sldId id="265" r:id="rId13"/>
     <p:sldId id="264" r:id="rId14"/>
-    <p:sldId id="263" r:id="rId15"/>
+    <p:sldId id="270" r:id="rId15"/>
+    <p:sldId id="272" r:id="rId16"/>
+    <p:sldId id="271" r:id="rId17"/>
+    <p:sldId id="263" r:id="rId18"/>
   </p:sldIdLst>
   <p:sldSz cx="9144000" cy="6858000" type="screen4x3"/>
   <p:notesSz cx="6858000" cy="9144000"/>
@@ -301,7 +304,7 @@
           <a:p>
             <a:fld id="{022E4692-C727-B144-B040-60D9A52E845A}" type="datetimeFigureOut">
               <a:rPr lang="en-US" smtClean="0"/>
-              <a:t>12-03-19</a:t>
+              <a:t>12-03-20</a:t>
             </a:fld>
             <a:endParaRPr lang="en-US"/>
           </a:p>
@@ -471,7 +474,7 @@
           <a:p>
             <a:fld id="{022E4692-C727-B144-B040-60D9A52E845A}" type="datetimeFigureOut">
               <a:rPr lang="en-US" smtClean="0"/>
-              <a:t>12-03-19</a:t>
+              <a:t>12-03-20</a:t>
             </a:fld>
             <a:endParaRPr lang="en-US"/>
           </a:p>
@@ -651,7 +654,7 @@
           <a:p>
             <a:fld id="{022E4692-C727-B144-B040-60D9A52E845A}" type="datetimeFigureOut">
               <a:rPr lang="en-US" smtClean="0"/>
-              <a:t>12-03-19</a:t>
+              <a:t>12-03-20</a:t>
             </a:fld>
             <a:endParaRPr lang="en-US"/>
           </a:p>
@@ -821,7 +824,7 @@
           <a:p>
             <a:fld id="{022E4692-C727-B144-B040-60D9A52E845A}" type="datetimeFigureOut">
               <a:rPr lang="en-US" smtClean="0"/>
-              <a:t>12-03-19</a:t>
+              <a:t>12-03-20</a:t>
             </a:fld>
             <a:endParaRPr lang="en-US"/>
           </a:p>
@@ -1067,7 +1070,7 @@
           <a:p>
             <a:fld id="{022E4692-C727-B144-B040-60D9A52E845A}" type="datetimeFigureOut">
               <a:rPr lang="en-US" smtClean="0"/>
-              <a:t>12-03-19</a:t>
+              <a:t>12-03-20</a:t>
             </a:fld>
             <a:endParaRPr lang="en-US"/>
           </a:p>
@@ -1355,7 +1358,7 @@
           <a:p>
             <a:fld id="{022E4692-C727-B144-B040-60D9A52E845A}" type="datetimeFigureOut">
               <a:rPr lang="en-US" smtClean="0"/>
-              <a:t>12-03-19</a:t>
+              <a:t>12-03-20</a:t>
             </a:fld>
             <a:endParaRPr lang="en-US"/>
           </a:p>
@@ -1777,7 +1780,7 @@
           <a:p>
             <a:fld id="{022E4692-C727-B144-B040-60D9A52E845A}" type="datetimeFigureOut">
               <a:rPr lang="en-US" smtClean="0"/>
-              <a:t>12-03-19</a:t>
+              <a:t>12-03-20</a:t>
             </a:fld>
             <a:endParaRPr lang="en-US"/>
           </a:p>
@@ -1895,7 +1898,7 @@
           <a:p>
             <a:fld id="{022E4692-C727-B144-B040-60D9A52E845A}" type="datetimeFigureOut">
               <a:rPr lang="en-US" smtClean="0"/>
-              <a:t>12-03-19</a:t>
+              <a:t>12-03-20</a:t>
             </a:fld>
             <a:endParaRPr lang="en-US"/>
           </a:p>
@@ -1990,7 +1993,7 @@
           <a:p>
             <a:fld id="{022E4692-C727-B144-B040-60D9A52E845A}" type="datetimeFigureOut">
               <a:rPr lang="en-US" smtClean="0"/>
-              <a:t>12-03-19</a:t>
+              <a:t>12-03-20</a:t>
             </a:fld>
             <a:endParaRPr lang="en-US"/>
           </a:p>
@@ -2267,7 +2270,7 @@
           <a:p>
             <a:fld id="{022E4692-C727-B144-B040-60D9A52E845A}" type="datetimeFigureOut">
               <a:rPr lang="en-US" smtClean="0"/>
-              <a:t>12-03-19</a:t>
+              <a:t>12-03-20</a:t>
             </a:fld>
             <a:endParaRPr lang="en-US"/>
           </a:p>
@@ -2520,7 +2523,7 @@
           <a:p>
             <a:fld id="{022E4692-C727-B144-B040-60D9A52E845A}" type="datetimeFigureOut">
               <a:rPr lang="en-US" smtClean="0"/>
-              <a:t>12-03-19</a:t>
+              <a:t>12-03-20</a:t>
             </a:fld>
             <a:endParaRPr lang="en-US"/>
           </a:p>
@@ -2733,7 +2736,7 @@
           <a:p>
             <a:fld id="{022E4692-C727-B144-B040-60D9A52E845A}" type="datetimeFigureOut">
               <a:rPr lang="en-US" smtClean="0"/>
-              <a:t>12-03-19</a:t>
+              <a:t>12-03-20</a:t>
             </a:fld>
             <a:endParaRPr lang="en-US"/>
           </a:p>
@@ -3530,6 +3533,268 @@
       </p:grpSpPr>
       <p:sp>
         <p:nvSpPr>
+          <p:cNvPr id="4" name="Title 3"/>
+          <p:cNvSpPr>
+            <a:spLocks noGrp="1"/>
+          </p:cNvSpPr>
+          <p:nvPr>
+            <p:ph type="title"/>
+          </p:nvPr>
+        </p:nvSpPr>
+        <p:spPr/>
+        <p:txBody>
+          <a:bodyPr/>
+          <a:lstStyle/>
+          <a:p>
+            <a:r>
+              <a:rPr lang="en-US" dirty="0" smtClean="0"/>
+              <a:t>Plotting</a:t>
+            </a:r>
+            <a:endParaRPr lang="en-US" dirty="0"/>
+          </a:p>
+        </p:txBody>
+      </p:sp>
+      <p:sp>
+        <p:nvSpPr>
+          <p:cNvPr id="5" name="Text Placeholder 4"/>
+          <p:cNvSpPr>
+            <a:spLocks noGrp="1"/>
+          </p:cNvSpPr>
+          <p:nvPr>
+            <p:ph type="body" idx="1"/>
+          </p:nvPr>
+        </p:nvSpPr>
+        <p:spPr/>
+        <p:txBody>
+          <a:bodyPr/>
+          <a:lstStyle/>
+          <a:p>
+            <a:r>
+              <a:rPr lang="en-US" dirty="0" err="1" smtClean="0"/>
+              <a:t>dd.ui.plot</a:t>
+            </a:r>
+            <a:endParaRPr lang="en-US" dirty="0"/>
+          </a:p>
+        </p:txBody>
+      </p:sp>
+    </p:spTree>
+    <p:extLst>
+      <p:ext uri="{BB962C8B-B14F-4D97-AF65-F5344CB8AC3E}">
+        <p14:creationId xmlns:p14="http://schemas.microsoft.com/office/powerpoint/2010/main" val="3782087950"/>
+      </p:ext>
+    </p:extLst>
+  </p:cSld>
+  <p:clrMapOvr>
+    <a:masterClrMapping/>
+  </p:clrMapOvr>
+</p:sld>
+</file>
+
+<file path=ppt/slides/slide15.xml><?xml version="1.0" encoding="utf-8"?>
+<p:sld xmlns:a="http://schemas.openxmlformats.org/drawingml/2006/main" xmlns:r="http://schemas.openxmlformats.org/officeDocument/2006/relationships" xmlns:p="http://schemas.openxmlformats.org/presentationml/2006/main">
+  <p:cSld>
+    <p:spTree>
+      <p:nvGrpSpPr>
+        <p:cNvPr id="1" name=""/>
+        <p:cNvGrpSpPr/>
+        <p:nvPr/>
+      </p:nvGrpSpPr>
+      <p:grpSpPr>
+        <a:xfrm>
+          <a:off x="0" y="0"/>
+          <a:ext cx="0" cy="0"/>
+          <a:chOff x="0" y="0"/>
+          <a:chExt cx="0" cy="0"/>
+        </a:xfrm>
+      </p:grpSpPr>
+      <p:sp>
+        <p:nvSpPr>
+          <p:cNvPr id="4" name="Title 3"/>
+          <p:cNvSpPr>
+            <a:spLocks noGrp="1"/>
+          </p:cNvSpPr>
+          <p:nvPr>
+            <p:ph type="title"/>
+          </p:nvPr>
+        </p:nvSpPr>
+        <p:spPr/>
+        <p:txBody>
+          <a:bodyPr/>
+          <a:lstStyle/>
+          <a:p>
+            <a:r>
+              <a:rPr lang="en-US" dirty="0" smtClean="0"/>
+              <a:t>Included Plot</a:t>
+            </a:r>
+            <a:endParaRPr lang="en-US" dirty="0"/>
+          </a:p>
+        </p:txBody>
+      </p:sp>
+      <p:sp>
+        <p:nvSpPr>
+          <p:cNvPr id="5" name="Content Placeholder 4"/>
+          <p:cNvSpPr>
+            <a:spLocks noGrp="1"/>
+          </p:cNvSpPr>
+          <p:nvPr>
+            <p:ph idx="1"/>
+          </p:nvPr>
+        </p:nvSpPr>
+        <p:spPr/>
+        <p:txBody>
+          <a:bodyPr/>
+          <a:lstStyle/>
+          <a:p>
+            <a:r>
+              <a:rPr lang="en-US" dirty="0" err="1" smtClean="0"/>
+              <a:t>dd.ui.VariancePlot</a:t>
+            </a:r>
+            <a:r>
+              <a:rPr lang="en-US" dirty="0" smtClean="0"/>
+              <a:t> gives the node energy variance that implements the usage</a:t>
+            </a:r>
+          </a:p>
+          <a:p>
+            <a:r>
+              <a:rPr lang="en-US" dirty="0" smtClean="0"/>
+              <a:t>It extends </a:t>
+            </a:r>
+            <a:r>
+              <a:rPr lang="en-US" dirty="0" err="1" smtClean="0"/>
+              <a:t>dd.ui.plot.PlotFrame</a:t>
+            </a:r>
+            <a:r>
+              <a:rPr lang="en-US" dirty="0" smtClean="0"/>
+              <a:t> to provide </a:t>
+            </a:r>
+            <a:r>
+              <a:rPr lang="en-US" smtClean="0"/>
+              <a:t>the plot</a:t>
+            </a:r>
+            <a:endParaRPr lang="en-US" dirty="0"/>
+          </a:p>
+        </p:txBody>
+      </p:sp>
+    </p:spTree>
+    <p:extLst>
+      <p:ext uri="{BB962C8B-B14F-4D97-AF65-F5344CB8AC3E}">
+        <p14:creationId xmlns:p14="http://schemas.microsoft.com/office/powerpoint/2010/main" val="924463522"/>
+      </p:ext>
+    </p:extLst>
+  </p:cSld>
+  <p:clrMapOvr>
+    <a:masterClrMapping/>
+  </p:clrMapOvr>
+</p:sld>
+</file>
+
+<file path=ppt/slides/slide16.xml><?xml version="1.0" encoding="utf-8"?>
+<p:sld xmlns:a="http://schemas.openxmlformats.org/drawingml/2006/main" xmlns:r="http://schemas.openxmlformats.org/officeDocument/2006/relationships" xmlns:p="http://schemas.openxmlformats.org/presentationml/2006/main">
+  <p:cSld>
+    <p:spTree>
+      <p:nvGrpSpPr>
+        <p:cNvPr id="1" name=""/>
+        <p:cNvGrpSpPr/>
+        <p:nvPr/>
+      </p:nvGrpSpPr>
+      <p:grpSpPr>
+        <a:xfrm>
+          <a:off x="0" y="0"/>
+          <a:ext cx="0" cy="0"/>
+          <a:chOff x="0" y="0"/>
+          <a:chExt cx="0" cy="0"/>
+        </a:xfrm>
+      </p:grpSpPr>
+      <p:sp>
+        <p:nvSpPr>
+          <p:cNvPr id="4" name="Title 3"/>
+          <p:cNvSpPr>
+            <a:spLocks noGrp="1"/>
+          </p:cNvSpPr>
+          <p:nvPr>
+            <p:ph type="title"/>
+          </p:nvPr>
+        </p:nvSpPr>
+        <p:spPr/>
+        <p:txBody>
+          <a:bodyPr/>
+          <a:lstStyle/>
+          <a:p>
+            <a:r>
+              <a:rPr lang="en-US" dirty="0" smtClean="0"/>
+              <a:t>Changing Plots</a:t>
+            </a:r>
+            <a:endParaRPr lang="en-US" dirty="0"/>
+          </a:p>
+        </p:txBody>
+      </p:sp>
+      <p:sp>
+        <p:nvSpPr>
+          <p:cNvPr id="5" name="Content Placeholder 4"/>
+          <p:cNvSpPr>
+            <a:spLocks noGrp="1"/>
+          </p:cNvSpPr>
+          <p:nvPr>
+            <p:ph idx="1"/>
+          </p:nvPr>
+        </p:nvSpPr>
+        <p:spPr/>
+        <p:txBody>
+          <a:bodyPr/>
+          <a:lstStyle/>
+          <a:p>
+            <a:r>
+              <a:rPr lang="en-US" dirty="0" err="1" smtClean="0"/>
+              <a:t>getTrace</a:t>
+            </a:r>
+            <a:r>
+              <a:rPr lang="en-US" dirty="0" smtClean="0"/>
+              <a:t> is fallback – use only when </a:t>
+            </a:r>
+            <a:r>
+              <a:rPr lang="en-US" dirty="0" err="1" smtClean="0"/>
+              <a:t>accessor</a:t>
+            </a:r>
+            <a:r>
+              <a:rPr lang="en-US" dirty="0" smtClean="0"/>
+              <a:t> does not meet requirements</a:t>
+            </a:r>
+            <a:endParaRPr lang="en-US" dirty="0"/>
+          </a:p>
+        </p:txBody>
+      </p:sp>
+    </p:spTree>
+    <p:extLst>
+      <p:ext uri="{BB962C8B-B14F-4D97-AF65-F5344CB8AC3E}">
+        <p14:creationId xmlns:p14="http://schemas.microsoft.com/office/powerpoint/2010/main" val="2738371152"/>
+      </p:ext>
+    </p:extLst>
+  </p:cSld>
+  <p:clrMapOvr>
+    <a:masterClrMapping/>
+  </p:clrMapOvr>
+</p:sld>
+</file>
+
+<file path=ppt/slides/slide17.xml><?xml version="1.0" encoding="utf-8"?>
+<p:sld xmlns:a="http://schemas.openxmlformats.org/drawingml/2006/main" xmlns:r="http://schemas.openxmlformats.org/officeDocument/2006/relationships" xmlns:p="http://schemas.openxmlformats.org/presentationml/2006/main">
+  <p:cSld>
+    <p:spTree>
+      <p:nvGrpSpPr>
+        <p:cNvPr id="1" name=""/>
+        <p:cNvGrpSpPr/>
+        <p:nvPr/>
+      </p:nvGrpSpPr>
+      <p:grpSpPr>
+        <a:xfrm>
+          <a:off x="0" y="0"/>
+          <a:ext cx="0" cy="0"/>
+          <a:chOff x="0" y="0"/>
+          <a:chExt cx="0" cy="0"/>
+        </a:xfrm>
+      </p:grpSpPr>
+      <p:sp>
+        <p:nvSpPr>
           <p:cNvPr id="2" name="Title 1"/>
           <p:cNvSpPr>
             <a:spLocks noGrp="1"/>
@@ -3842,7 +4107,19 @@
             </a:r>
             <a:r>
               <a:rPr lang="en-US" dirty="0" err="1" smtClean="0"/>
-              <a:t>dd.ui.event</a:t>
+              <a:t>dd.ui.list</a:t>
+            </a:r>
+            <a:endParaRPr lang="en-US" dirty="0"/>
+          </a:p>
+          <a:p>
+            <a:pPr lvl="1"/>
+            <a:r>
+              <a:rPr lang="en-US" dirty="0" smtClean="0"/>
+              <a:t>Tests: </a:t>
+            </a:r>
+            <a:r>
+              <a:rPr lang="en-US" dirty="0" err="1" smtClean="0"/>
+              <a:t>dd.ui.test</a:t>
             </a:r>
             <a:endParaRPr lang="en-US" dirty="0" smtClean="0"/>
           </a:p>
@@ -3987,8 +4264,28 @@
             </a:r>
             <a:r>
               <a:rPr lang="en-US" dirty="0" smtClean="0"/>
-              <a:t>: a basic example with the JChart2D library</a:t>
-            </a:r>
+              <a:t>: a basic example with the JChart2D </a:t>
+            </a:r>
+            <a:r>
+              <a:rPr lang="en-US" dirty="0" smtClean="0"/>
+              <a:t>library</a:t>
+            </a:r>
+          </a:p>
+          <a:p>
+            <a:pPr lvl="1"/>
+            <a:r>
+              <a:rPr lang="en-US" dirty="0" err="1" smtClean="0"/>
+              <a:t>VariancePlotTest</a:t>
+            </a:r>
+            <a:r>
+              <a:rPr lang="en-US" dirty="0" smtClean="0"/>
+              <a:t>: runs the same as </a:t>
+            </a:r>
+            <a:r>
+              <a:rPr lang="en-US" dirty="0" err="1" smtClean="0"/>
+              <a:t>dd.NodeTest</a:t>
+            </a:r>
+            <a:endParaRPr lang="en-US" dirty="0" smtClean="0"/>
           </a:p>
           <a:p>
             <a:pPr lvl="1"/>

</xml_diff>

<commit_message>
Updated the UML model diagrams for plotting, added more notes to the slides to send out.
</commit_message>
<xml_diff>
--- a/doc/DDSimulation_Graphical.pptx
+++ b/doc/DDSimulation_Graphical.pptx
@@ -19,9 +19,12 @@
     <p:sldId id="265" r:id="rId13"/>
     <p:sldId id="264" r:id="rId14"/>
     <p:sldId id="270" r:id="rId15"/>
-    <p:sldId id="272" r:id="rId16"/>
-    <p:sldId id="271" r:id="rId17"/>
-    <p:sldId id="263" r:id="rId18"/>
+    <p:sldId id="273" r:id="rId16"/>
+    <p:sldId id="274" r:id="rId17"/>
+    <p:sldId id="275" r:id="rId18"/>
+    <p:sldId id="272" r:id="rId19"/>
+    <p:sldId id="271" r:id="rId20"/>
+    <p:sldId id="263" r:id="rId21"/>
   </p:sldIdLst>
   <p:sldSz cx="9144000" cy="6858000" type="screen4x3"/>
   <p:notesSz cx="6858000" cy="9144000"/>
@@ -304,7 +307,7 @@
           <a:p>
             <a:fld id="{022E4692-C727-B144-B040-60D9A52E845A}" type="datetimeFigureOut">
               <a:rPr lang="en-US" smtClean="0"/>
-              <a:t>12-03-20</a:t>
+              <a:t>3/21/2012</a:t>
             </a:fld>
             <a:endParaRPr lang="en-US"/>
           </a:p>
@@ -474,7 +477,7 @@
           <a:p>
             <a:fld id="{022E4692-C727-B144-B040-60D9A52E845A}" type="datetimeFigureOut">
               <a:rPr lang="en-US" smtClean="0"/>
-              <a:t>12-03-20</a:t>
+              <a:t>3/21/2012</a:t>
             </a:fld>
             <a:endParaRPr lang="en-US"/>
           </a:p>
@@ -654,7 +657,7 @@
           <a:p>
             <a:fld id="{022E4692-C727-B144-B040-60D9A52E845A}" type="datetimeFigureOut">
               <a:rPr lang="en-US" smtClean="0"/>
-              <a:t>12-03-20</a:t>
+              <a:t>3/21/2012</a:t>
             </a:fld>
             <a:endParaRPr lang="en-US"/>
           </a:p>
@@ -824,7 +827,7 @@
           <a:p>
             <a:fld id="{022E4692-C727-B144-B040-60D9A52E845A}" type="datetimeFigureOut">
               <a:rPr lang="en-US" smtClean="0"/>
-              <a:t>12-03-20</a:t>
+              <a:t>3/21/2012</a:t>
             </a:fld>
             <a:endParaRPr lang="en-US"/>
           </a:p>
@@ -1070,7 +1073,7 @@
           <a:p>
             <a:fld id="{022E4692-C727-B144-B040-60D9A52E845A}" type="datetimeFigureOut">
               <a:rPr lang="en-US" smtClean="0"/>
-              <a:t>12-03-20</a:t>
+              <a:t>3/21/2012</a:t>
             </a:fld>
             <a:endParaRPr lang="en-US"/>
           </a:p>
@@ -1358,7 +1361,7 @@
           <a:p>
             <a:fld id="{022E4692-C727-B144-B040-60D9A52E845A}" type="datetimeFigureOut">
               <a:rPr lang="en-US" smtClean="0"/>
-              <a:t>12-03-20</a:t>
+              <a:t>3/21/2012</a:t>
             </a:fld>
             <a:endParaRPr lang="en-US"/>
           </a:p>
@@ -1780,7 +1783,7 @@
           <a:p>
             <a:fld id="{022E4692-C727-B144-B040-60D9A52E845A}" type="datetimeFigureOut">
               <a:rPr lang="en-US" smtClean="0"/>
-              <a:t>12-03-20</a:t>
+              <a:t>3/21/2012</a:t>
             </a:fld>
             <a:endParaRPr lang="en-US"/>
           </a:p>
@@ -1898,7 +1901,7 @@
           <a:p>
             <a:fld id="{022E4692-C727-B144-B040-60D9A52E845A}" type="datetimeFigureOut">
               <a:rPr lang="en-US" smtClean="0"/>
-              <a:t>12-03-20</a:t>
+              <a:t>3/21/2012</a:t>
             </a:fld>
             <a:endParaRPr lang="en-US"/>
           </a:p>
@@ -1993,7 +1996,7 @@
           <a:p>
             <a:fld id="{022E4692-C727-B144-B040-60D9A52E845A}" type="datetimeFigureOut">
               <a:rPr lang="en-US" smtClean="0"/>
-              <a:t>12-03-20</a:t>
+              <a:t>3/21/2012</a:t>
             </a:fld>
             <a:endParaRPr lang="en-US"/>
           </a:p>
@@ -2270,7 +2273,7 @@
           <a:p>
             <a:fld id="{022E4692-C727-B144-B040-60D9A52E845A}" type="datetimeFigureOut">
               <a:rPr lang="en-US" smtClean="0"/>
-              <a:t>12-03-20</a:t>
+              <a:t>3/21/2012</a:t>
             </a:fld>
             <a:endParaRPr lang="en-US"/>
           </a:p>
@@ -2523,7 +2526,7 @@
           <a:p>
             <a:fld id="{022E4692-C727-B144-B040-60D9A52E845A}" type="datetimeFigureOut">
               <a:rPr lang="en-US" smtClean="0"/>
-              <a:t>12-03-20</a:t>
+              <a:t>3/21/2012</a:t>
             </a:fld>
             <a:endParaRPr lang="en-US"/>
           </a:p>
@@ -2736,7 +2739,7 @@
           <a:p>
             <a:fld id="{022E4692-C727-B144-B040-60D9A52E845A}" type="datetimeFigureOut">
               <a:rPr lang="en-US" smtClean="0"/>
-              <a:t>12-03-20</a:t>
+              <a:t>3/21/2012</a:t>
             </a:fld>
             <a:endParaRPr lang="en-US"/>
           </a:p>
@@ -3624,7 +3627,7 @@
           <a:p>
             <a:r>
               <a:rPr lang="en-US" dirty="0" smtClean="0"/>
-              <a:t>Included Plot</a:t>
+              <a:t>Gathering Data</a:t>
             </a:r>
             <a:endParaRPr lang="en-US" dirty="0"/>
           </a:p>
@@ -3642,43 +3645,69 @@
         </p:nvSpPr>
         <p:spPr/>
         <p:txBody>
-          <a:bodyPr/>
-          <a:lstStyle/>
-          <a:p>
+          <a:bodyPr>
+            <a:normAutofit lnSpcReduction="10000"/>
+          </a:bodyPr>
+          <a:lstStyle/>
+          <a:p>
+            <a:r>
+              <a:rPr lang="en-US" dirty="0" smtClean="0"/>
+              <a:t>An instance of the </a:t>
+            </a:r>
             <a:r>
               <a:rPr lang="en-US" dirty="0" err="1" smtClean="0"/>
-              <a:t>dd.ui.VariancePlot</a:t>
-            </a:r>
-            <a:r>
-              <a:rPr lang="en-US" dirty="0" smtClean="0"/>
-              <a:t> gives the node energy variance that implements the usage</a:t>
-            </a:r>
-          </a:p>
-          <a:p>
-            <a:r>
-              <a:rPr lang="en-US" dirty="0" smtClean="0"/>
-              <a:t>It extends </a:t>
-            </a:r>
+              <a:t>dd.ui.plot.NodeDataCollector</a:t>
+            </a:r>
+            <a:r>
+              <a:rPr lang="en-US" dirty="0" smtClean="0"/>
+              <a:t> gets the data, based on configurable timer</a:t>
+            </a:r>
+          </a:p>
+          <a:p>
+            <a:pPr lvl="1"/>
+            <a:r>
+              <a:rPr lang="en-US" dirty="0" smtClean="0"/>
+              <a:t>Gathers the node energy, registers the sum</a:t>
+            </a:r>
+          </a:p>
+          <a:p>
             <a:r>
               <a:rPr lang="en-US" dirty="0" err="1" smtClean="0"/>
-              <a:t>dd.ui.plot.PlotFrame</a:t>
-            </a:r>
-            <a:r>
-              <a:rPr lang="en-US" dirty="0" smtClean="0"/>
-              <a:t> to provide </a:t>
-            </a:r>
-            <a:r>
-              <a:rPr lang="en-US" smtClean="0"/>
-              <a:t>the plot</a:t>
-            </a:r>
-            <a:endParaRPr lang="en-US" dirty="0"/>
+              <a:t>dd.ui.plot.VarianceCollector</a:t>
+            </a:r>
+            <a:r>
+              <a:rPr lang="en-US" dirty="0" smtClean="0"/>
+              <a:t> - similar operation, registers the variance of data instead though</a:t>
+            </a:r>
+          </a:p>
+          <a:p>
+            <a:r>
+              <a:rPr lang="en-US" dirty="0" err="1" smtClean="0"/>
+              <a:t>NodeDataCollector</a:t>
+            </a:r>
+            <a:r>
+              <a:rPr lang="en-US" dirty="0" smtClean="0"/>
+              <a:t> derives from </a:t>
+            </a:r>
+            <a:r>
+              <a:rPr lang="en-US" dirty="0" err="1" smtClean="0"/>
+              <a:t>ADataCollector</a:t>
+            </a:r>
+            <a:r>
+              <a:rPr lang="en-US" dirty="0"/>
+              <a:t> </a:t>
+            </a:r>
+            <a:r>
+              <a:rPr lang="en-US" dirty="0" smtClean="0"/>
+              <a:t>(JChart2D library) </a:t>
+            </a:r>
           </a:p>
         </p:txBody>
       </p:sp>
     </p:spTree>
     <p:extLst>
       <p:ext uri="{BB962C8B-B14F-4D97-AF65-F5344CB8AC3E}">
-        <p14:creationId xmlns:p14="http://schemas.microsoft.com/office/powerpoint/2010/main" val="924463522"/>
+        <p14:creationId xmlns:p14="http://schemas.microsoft.com/office/powerpoint/2010/main" val="2685713138"/>
       </p:ext>
     </p:extLst>
   </p:cSld>
@@ -3707,7 +3736,7 @@
       </p:grpSpPr>
       <p:sp>
         <p:nvSpPr>
-          <p:cNvPr id="4" name="Title 3"/>
+          <p:cNvPr id="2" name="Title 1"/>
           <p:cNvSpPr>
             <a:spLocks noGrp="1"/>
           </p:cNvSpPr>
@@ -3722,7 +3751,7 @@
           <a:p>
             <a:r>
               <a:rPr lang="en-US" dirty="0" smtClean="0"/>
-              <a:t>Changing Plots</a:t>
+              <a:t>Data Gathering Classes</a:t>
             </a:r>
             <a:endParaRPr lang="en-US" dirty="0"/>
           </a:p>
@@ -3730,7 +3759,7 @@
       </p:sp>
       <p:sp>
         <p:nvSpPr>
-          <p:cNvPr id="5" name="Content Placeholder 4"/>
+          <p:cNvPr id="3" name="Content Placeholder 2"/>
           <p:cNvSpPr>
             <a:spLocks noGrp="1"/>
           </p:cNvSpPr>
@@ -3744,20 +3773,12 @@
           <a:lstStyle/>
           <a:p>
             <a:r>
-              <a:rPr lang="en-US" dirty="0" err="1" smtClean="0"/>
-              <a:t>getTrace</a:t>
-            </a:r>
-            <a:r>
-              <a:rPr lang="en-US" dirty="0" smtClean="0"/>
-              <a:t> is fallback – use only when </a:t>
-            </a:r>
-            <a:r>
-              <a:rPr lang="en-US" dirty="0" err="1" smtClean="0"/>
-              <a:t>accessor</a:t>
-            </a:r>
-            <a:r>
-              <a:rPr lang="en-US" dirty="0" smtClean="0"/>
-              <a:t> does not meet requirements</a:t>
+              <a:rPr lang="en-US" dirty="0" smtClean="0"/>
+              <a:t>TODO class diagrams for </a:t>
+            </a:r>
+            <a:r>
+              <a:rPr lang="en-US" smtClean="0"/>
+              <a:t>these classes</a:t>
             </a:r>
             <a:endParaRPr lang="en-US" dirty="0"/>
           </a:p>
@@ -3766,7 +3787,7 @@
     </p:spTree>
     <p:extLst>
       <p:ext uri="{BB962C8B-B14F-4D97-AF65-F5344CB8AC3E}">
-        <p14:creationId xmlns:p14="http://schemas.microsoft.com/office/powerpoint/2010/main" val="2738371152"/>
+        <p14:creationId xmlns:p14="http://schemas.microsoft.com/office/powerpoint/2010/main" val="850409464"/>
       </p:ext>
     </p:extLst>
   </p:cSld>
@@ -3810,7 +3831,7 @@
           <a:p>
             <a:r>
               <a:rPr lang="en-US" dirty="0" smtClean="0"/>
-              <a:t>Resources</a:t>
+              <a:t>Setting Collector</a:t>
             </a:r>
             <a:endParaRPr lang="en-US" dirty="0"/>
           </a:p>
@@ -3832,76 +3853,27 @@
           <a:lstStyle/>
           <a:p>
             <a:r>
-              <a:rPr lang="en-US" dirty="0" smtClean="0"/>
-              <a:t>For Java swing programming:</a:t>
-            </a:r>
-          </a:p>
-          <a:p>
-            <a:pPr lvl="1"/>
-            <a:r>
-              <a:rPr lang="en-US" dirty="0" smtClean="0"/>
-              <a:t>http://</a:t>
-            </a:r>
-            <a:r>
               <a:rPr lang="en-US" dirty="0" err="1" smtClean="0"/>
-              <a:t>docs.oracle.com</a:t>
-            </a:r>
-            <a:r>
-              <a:rPr lang="en-US" dirty="0" smtClean="0"/>
-              <a:t>/</a:t>
+              <a:t>PlotFrame</a:t>
+            </a:r>
+            <a:r>
+              <a:rPr lang="en-US" dirty="0" smtClean="0"/>
+              <a:t> calls </a:t>
             </a:r>
             <a:r>
               <a:rPr lang="en-US" dirty="0" err="1" smtClean="0"/>
-              <a:t>javase</a:t>
-            </a:r>
-            <a:r>
-              <a:rPr lang="en-US" dirty="0" smtClean="0"/>
-              <a:t>/tutorial/</a:t>
-            </a:r>
-            <a:r>
-              <a:rPr lang="en-US" dirty="0" err="1" smtClean="0"/>
-              <a:t>uiswing</a:t>
-            </a:r>
-            <a:r>
-              <a:rPr lang="en-US" dirty="0" smtClean="0"/>
-              <a:t>/</a:t>
-            </a:r>
-          </a:p>
-          <a:p>
-            <a:r>
-              <a:rPr lang="en-US" dirty="0" smtClean="0"/>
-              <a:t>For Chart2D:</a:t>
-            </a:r>
-          </a:p>
-          <a:p>
-            <a:pPr lvl="1"/>
-            <a:r>
-              <a:rPr lang="en-US" dirty="0" smtClean="0">
-                <a:hlinkClick r:id="rId2"/>
-              </a:rPr>
-              <a:t>http://jchart2d.sourceforge.net/</a:t>
-            </a:r>
-            <a:endParaRPr lang="en-US" dirty="0" smtClean="0"/>
-          </a:p>
-          <a:p>
-            <a:pPr lvl="1"/>
-            <a:r>
-              <a:rPr lang="en-US" dirty="0" smtClean="0"/>
-              <a:t>API Documentation: </a:t>
-            </a:r>
-            <a:r>
-              <a:rPr lang="en-US" dirty="0" smtClean="0">
-                <a:hlinkClick r:id="rId3"/>
-              </a:rPr>
-              <a:t>http://jchart2d.sourceforge.net/docs/javadoc/index.html</a:t>
-            </a:r>
-            <a:endParaRPr lang="en-US" dirty="0" smtClean="0"/>
-          </a:p>
-          <a:p>
-            <a:pPr lvl="1"/>
-            <a:endParaRPr lang="en-US" dirty="0" smtClean="0"/>
-          </a:p>
-          <a:p>
+              <a:t>setCollector</a:t>
+            </a:r>
+            <a:r>
+              <a:rPr lang="en-US" dirty="0" smtClean="0"/>
+              <a:t>(nodes, latency) as part of it’s initialization (after the trace is configured)</a:t>
+            </a:r>
+          </a:p>
+          <a:p>
+            <a:r>
+              <a:rPr lang="en-US" dirty="0" smtClean="0"/>
+              <a:t>Override the method to use a custom collector</a:t>
+            </a:r>
             <a:endParaRPr lang="en-US" dirty="0"/>
           </a:p>
         </p:txBody>
@@ -3909,7 +3881,221 @@
     </p:spTree>
     <p:extLst>
       <p:ext uri="{BB962C8B-B14F-4D97-AF65-F5344CB8AC3E}">
-        <p14:creationId xmlns:p14="http://schemas.microsoft.com/office/powerpoint/2010/main" val="440844422"/>
+        <p14:creationId xmlns:p14="http://schemas.microsoft.com/office/powerpoint/2010/main" val="3782583301"/>
+      </p:ext>
+    </p:extLst>
+  </p:cSld>
+  <p:clrMapOvr>
+    <a:masterClrMapping/>
+  </p:clrMapOvr>
+</p:sld>
+</file>
+
+<file path=ppt/slides/slide18.xml><?xml version="1.0" encoding="utf-8"?>
+<p:sld xmlns:a="http://schemas.openxmlformats.org/drawingml/2006/main" xmlns:r="http://schemas.openxmlformats.org/officeDocument/2006/relationships" xmlns:p="http://schemas.openxmlformats.org/presentationml/2006/main">
+  <p:cSld>
+    <p:spTree>
+      <p:nvGrpSpPr>
+        <p:cNvPr id="1" name=""/>
+        <p:cNvGrpSpPr/>
+        <p:nvPr/>
+      </p:nvGrpSpPr>
+      <p:grpSpPr>
+        <a:xfrm>
+          <a:off x="0" y="0"/>
+          <a:ext cx="0" cy="0"/>
+          <a:chOff x="0" y="0"/>
+          <a:chExt cx="0" cy="0"/>
+        </a:xfrm>
+      </p:grpSpPr>
+      <p:sp>
+        <p:nvSpPr>
+          <p:cNvPr id="4" name="Title 3"/>
+          <p:cNvSpPr>
+            <a:spLocks noGrp="1"/>
+          </p:cNvSpPr>
+          <p:nvPr>
+            <p:ph type="title"/>
+          </p:nvPr>
+        </p:nvSpPr>
+        <p:spPr/>
+        <p:txBody>
+          <a:bodyPr/>
+          <a:lstStyle/>
+          <a:p>
+            <a:r>
+              <a:rPr lang="en-US" dirty="0" smtClean="0"/>
+              <a:t>Included Plot</a:t>
+            </a:r>
+            <a:endParaRPr lang="en-US" dirty="0"/>
+          </a:p>
+        </p:txBody>
+      </p:sp>
+      <p:sp>
+        <p:nvSpPr>
+          <p:cNvPr id="5" name="Content Placeholder 4"/>
+          <p:cNvSpPr>
+            <a:spLocks noGrp="1"/>
+          </p:cNvSpPr>
+          <p:nvPr>
+            <p:ph idx="1"/>
+          </p:nvPr>
+        </p:nvSpPr>
+        <p:spPr/>
+        <p:txBody>
+          <a:bodyPr/>
+          <a:lstStyle/>
+          <a:p>
+            <a:r>
+              <a:rPr lang="en-US" dirty="0" err="1" smtClean="0"/>
+              <a:t>dd.ui.VariancePlot</a:t>
+            </a:r>
+            <a:r>
+              <a:rPr lang="en-US" dirty="0" smtClean="0"/>
+              <a:t> gives the node energy variance that implements the usage</a:t>
+            </a:r>
+          </a:p>
+          <a:p>
+            <a:r>
+              <a:rPr lang="en-US" dirty="0" smtClean="0"/>
+              <a:t>extend</a:t>
+            </a:r>
+            <a:r>
+              <a:rPr lang="en-US" dirty="0" smtClean="0"/>
+              <a:t>s </a:t>
+            </a:r>
+            <a:r>
+              <a:rPr lang="en-US" dirty="0" err="1" smtClean="0"/>
+              <a:t>dd.ui.plot.PlotFrame</a:t>
+            </a:r>
+            <a:r>
+              <a:rPr lang="en-US" dirty="0" smtClean="0"/>
+              <a:t> to provide the </a:t>
+            </a:r>
+            <a:r>
+              <a:rPr lang="en-US" dirty="0" smtClean="0"/>
+              <a:t>plot</a:t>
+            </a:r>
+          </a:p>
+          <a:p>
+            <a:pPr lvl="1"/>
+            <a:r>
+              <a:rPr lang="en-US" dirty="0" smtClean="0"/>
+              <a:t>Includes a title pane, the chart and start/stop control</a:t>
+            </a:r>
+          </a:p>
+        </p:txBody>
+      </p:sp>
+    </p:spTree>
+    <p:extLst>
+      <p:ext uri="{BB962C8B-B14F-4D97-AF65-F5344CB8AC3E}">
+        <p14:creationId xmlns:p14="http://schemas.microsoft.com/office/powerpoint/2010/main" val="924463522"/>
+      </p:ext>
+    </p:extLst>
+  </p:cSld>
+  <p:clrMapOvr>
+    <a:masterClrMapping/>
+  </p:clrMapOvr>
+</p:sld>
+</file>
+
+<file path=ppt/slides/slide19.xml><?xml version="1.0" encoding="utf-8"?>
+<p:sld xmlns:a="http://schemas.openxmlformats.org/drawingml/2006/main" xmlns:r="http://schemas.openxmlformats.org/officeDocument/2006/relationships" xmlns:p="http://schemas.openxmlformats.org/presentationml/2006/main">
+  <p:cSld>
+    <p:spTree>
+      <p:nvGrpSpPr>
+        <p:cNvPr id="1" name=""/>
+        <p:cNvGrpSpPr/>
+        <p:nvPr/>
+      </p:nvGrpSpPr>
+      <p:grpSpPr>
+        <a:xfrm>
+          <a:off x="0" y="0"/>
+          <a:ext cx="0" cy="0"/>
+          <a:chOff x="0" y="0"/>
+          <a:chExt cx="0" cy="0"/>
+        </a:xfrm>
+      </p:grpSpPr>
+      <p:sp>
+        <p:nvSpPr>
+          <p:cNvPr id="4" name="Title 3"/>
+          <p:cNvSpPr>
+            <a:spLocks noGrp="1"/>
+          </p:cNvSpPr>
+          <p:nvPr>
+            <p:ph type="title"/>
+          </p:nvPr>
+        </p:nvSpPr>
+        <p:spPr/>
+        <p:txBody>
+          <a:bodyPr/>
+          <a:lstStyle/>
+          <a:p>
+            <a:r>
+              <a:rPr lang="en-US" dirty="0" smtClean="0"/>
+              <a:t>Changing Plots</a:t>
+            </a:r>
+            <a:endParaRPr lang="en-US" dirty="0"/>
+          </a:p>
+        </p:txBody>
+      </p:sp>
+      <p:sp>
+        <p:nvSpPr>
+          <p:cNvPr id="5" name="Content Placeholder 4"/>
+          <p:cNvSpPr>
+            <a:spLocks noGrp="1"/>
+          </p:cNvSpPr>
+          <p:nvPr>
+            <p:ph idx="1"/>
+          </p:nvPr>
+        </p:nvSpPr>
+        <p:spPr/>
+        <p:txBody>
+          <a:bodyPr/>
+          <a:lstStyle/>
+          <a:p>
+            <a:r>
+              <a:rPr lang="en-US" dirty="0" err="1" smtClean="0"/>
+              <a:t>getTrace</a:t>
+            </a:r>
+            <a:r>
+              <a:rPr lang="en-US" dirty="0" smtClean="0"/>
+              <a:t> </a:t>
+            </a:r>
+            <a:r>
+              <a:rPr lang="en-US" dirty="0" smtClean="0"/>
+              <a:t>is fallback – use only when </a:t>
+            </a:r>
+            <a:r>
+              <a:rPr lang="en-US" dirty="0" err="1" smtClean="0"/>
+              <a:t>accessors</a:t>
+            </a:r>
+            <a:r>
+              <a:rPr lang="en-US" dirty="0" smtClean="0"/>
+              <a:t> do not </a:t>
+            </a:r>
+            <a:r>
+              <a:rPr lang="en-US" dirty="0" smtClean="0"/>
+              <a:t>meet </a:t>
+            </a:r>
+            <a:r>
+              <a:rPr lang="en-US" dirty="0" smtClean="0"/>
+              <a:t>requirements</a:t>
+            </a:r>
+          </a:p>
+          <a:p>
+            <a:r>
+              <a:rPr lang="en-US" dirty="0" smtClean="0"/>
+              <a:t>Various methods for updating things </a:t>
+            </a:r>
+            <a:endParaRPr lang="en-US" dirty="0"/>
+          </a:p>
+        </p:txBody>
+      </p:sp>
+    </p:spTree>
+    <p:extLst>
+      <p:ext uri="{BB962C8B-B14F-4D97-AF65-F5344CB8AC3E}">
+        <p14:creationId xmlns:p14="http://schemas.microsoft.com/office/powerpoint/2010/main" val="2738371152"/>
       </p:ext>
     </p:extLst>
   </p:cSld>
@@ -4021,6 +4207,149 @@
     <p:extLst>
       <p:ext uri="{BB962C8B-B14F-4D97-AF65-F5344CB8AC3E}">
         <p14:creationId xmlns:p14="http://schemas.microsoft.com/office/powerpoint/2010/main" val="3129238097"/>
+      </p:ext>
+    </p:extLst>
+  </p:cSld>
+  <p:clrMapOvr>
+    <a:masterClrMapping/>
+  </p:clrMapOvr>
+</p:sld>
+</file>
+
+<file path=ppt/slides/slide20.xml><?xml version="1.0" encoding="utf-8"?>
+<p:sld xmlns:a="http://schemas.openxmlformats.org/drawingml/2006/main" xmlns:r="http://schemas.openxmlformats.org/officeDocument/2006/relationships" xmlns:p="http://schemas.openxmlformats.org/presentationml/2006/main">
+  <p:cSld>
+    <p:spTree>
+      <p:nvGrpSpPr>
+        <p:cNvPr id="1" name=""/>
+        <p:cNvGrpSpPr/>
+        <p:nvPr/>
+      </p:nvGrpSpPr>
+      <p:grpSpPr>
+        <a:xfrm>
+          <a:off x="0" y="0"/>
+          <a:ext cx="0" cy="0"/>
+          <a:chOff x="0" y="0"/>
+          <a:chExt cx="0" cy="0"/>
+        </a:xfrm>
+      </p:grpSpPr>
+      <p:sp>
+        <p:nvSpPr>
+          <p:cNvPr id="2" name="Title 1"/>
+          <p:cNvSpPr>
+            <a:spLocks noGrp="1"/>
+          </p:cNvSpPr>
+          <p:nvPr>
+            <p:ph type="title"/>
+          </p:nvPr>
+        </p:nvSpPr>
+        <p:spPr/>
+        <p:txBody>
+          <a:bodyPr/>
+          <a:lstStyle/>
+          <a:p>
+            <a:r>
+              <a:rPr lang="en-US" dirty="0" smtClean="0"/>
+              <a:t>Resources</a:t>
+            </a:r>
+            <a:endParaRPr lang="en-US" dirty="0"/>
+          </a:p>
+        </p:txBody>
+      </p:sp>
+      <p:sp>
+        <p:nvSpPr>
+          <p:cNvPr id="3" name="Content Placeholder 2"/>
+          <p:cNvSpPr>
+            <a:spLocks noGrp="1"/>
+          </p:cNvSpPr>
+          <p:nvPr>
+            <p:ph idx="1"/>
+          </p:nvPr>
+        </p:nvSpPr>
+        <p:spPr/>
+        <p:txBody>
+          <a:bodyPr/>
+          <a:lstStyle/>
+          <a:p>
+            <a:r>
+              <a:rPr lang="en-US" dirty="0" smtClean="0"/>
+              <a:t>For Java swing programming:</a:t>
+            </a:r>
+          </a:p>
+          <a:p>
+            <a:pPr lvl="1"/>
+            <a:r>
+              <a:rPr lang="en-US" dirty="0" smtClean="0"/>
+              <a:t>http://</a:t>
+            </a:r>
+            <a:r>
+              <a:rPr lang="en-US" dirty="0" err="1" smtClean="0"/>
+              <a:t>docs.oracle.com</a:t>
+            </a:r>
+            <a:r>
+              <a:rPr lang="en-US" dirty="0" smtClean="0"/>
+              <a:t>/</a:t>
+            </a:r>
+            <a:r>
+              <a:rPr lang="en-US" dirty="0" err="1" smtClean="0"/>
+              <a:t>javase</a:t>
+            </a:r>
+            <a:r>
+              <a:rPr lang="en-US" dirty="0" smtClean="0"/>
+              <a:t>/tutorial/</a:t>
+            </a:r>
+            <a:r>
+              <a:rPr lang="en-US" dirty="0" err="1" smtClean="0"/>
+              <a:t>uiswing</a:t>
+            </a:r>
+            <a:r>
+              <a:rPr lang="en-US" dirty="0" smtClean="0"/>
+              <a:t>/</a:t>
+            </a:r>
+          </a:p>
+          <a:p>
+            <a:r>
+              <a:rPr lang="en-US" dirty="0" smtClean="0"/>
+              <a:t>For Chart2D:</a:t>
+            </a:r>
+          </a:p>
+          <a:p>
+            <a:pPr lvl="1"/>
+            <a:r>
+              <a:rPr lang="en-US" dirty="0" smtClean="0">
+                <a:hlinkClick r:id="rId2"/>
+              </a:rPr>
+              <a:t>http://jchart2d.sourceforge.net/</a:t>
+            </a:r>
+            <a:endParaRPr lang="en-US" dirty="0" smtClean="0"/>
+          </a:p>
+          <a:p>
+            <a:pPr lvl="1"/>
+            <a:r>
+              <a:rPr lang="en-US" dirty="0" smtClean="0"/>
+              <a:t>API Documentation: </a:t>
+            </a:r>
+            <a:r>
+              <a:rPr lang="en-US" dirty="0" smtClean="0">
+                <a:hlinkClick r:id="rId3"/>
+              </a:rPr>
+              <a:t>http://jchart2d.sourceforge.net/docs/javadoc/index.html</a:t>
+            </a:r>
+            <a:endParaRPr lang="en-US" dirty="0" smtClean="0"/>
+          </a:p>
+          <a:p>
+            <a:pPr lvl="1"/>
+            <a:endParaRPr lang="en-US" dirty="0" smtClean="0"/>
+          </a:p>
+          <a:p>
+            <a:endParaRPr lang="en-US" dirty="0"/>
+          </a:p>
+        </p:txBody>
+      </p:sp>
+    </p:spTree>
+    <p:extLst>
+      <p:ext uri="{BB962C8B-B14F-4D97-AF65-F5344CB8AC3E}">
+        <p14:creationId xmlns:p14="http://schemas.microsoft.com/office/powerpoint/2010/main" val="440844422"/>
       </p:ext>
     </p:extLst>
   </p:cSld>
@@ -4264,11 +4593,7 @@
             </a:r>
             <a:r>
               <a:rPr lang="en-US" dirty="0" smtClean="0"/>
-              <a:t>: a basic example with the JChart2D </a:t>
-            </a:r>
-            <a:r>
-              <a:rPr lang="en-US" dirty="0" smtClean="0"/>
-              <a:t>library</a:t>
+              <a:t>: a basic example with the JChart2D library</a:t>
             </a:r>
           </a:p>
           <a:p>

</xml_diff>